<commit_message>
new:usr: update document for pdf to docx
</commit_message>
<xml_diff>
--- a/docs/NBDPWG-vol8.pptx
+++ b/docs/NBDPWG-vol8.pptx
@@ -42035,15 +42035,19 @@
             <a:pPr lvl="1"/>
             <a:r>
               <a:rPr lang="en-US" dirty="0" smtClean="0"/>
-              <a:t>Removal of “Dracula Users”: I suck you dry and </a:t>
+              <a:t>Removal of “Dracula Users”: I suck you dry </a:t>
             </a:r>
             <a:r>
-              <a:rPr lang="en-US" dirty="0" err="1" smtClean="0"/>
-              <a:t>cinsume</a:t>
+              <a:rPr lang="en-US" smtClean="0"/>
+              <a:t>and </a:t>
+            </a:r>
+            <a:r>
+              <a:rPr lang="en-US" smtClean="0"/>
+              <a:t>consume </a:t>
             </a:r>
             <a:r>
               <a:rPr lang="en-US" dirty="0" smtClean="0"/>
-              <a:t> all your hours as I will ignore your policies will fully (yes, they do exist)</a:t>
+              <a:t>all your hours as I will ignore your policies will fully (yes, they do exist)</a:t>
             </a:r>
           </a:p>
           <a:p>

</xml_diff>